<commit_message>
It works ! :)
</commit_message>
<xml_diff>
--- a/docs/RISCME..pptx
+++ b/docs/RISCME..pptx
@@ -19331,17 +19331,6 @@
                         </a:rPr>
                         <a:t>11</a:t>
                       </a:r>
-                      <a:endParaRPr kumimoji="0" lang="en-US" sz="1800" b="0" i="0" u="none" strike="noStrike" cap="none" normalizeH="0" baseline="0" dirty="0" smtClean="0">
-                        <a:ln>
-                          <a:noFill/>
-                        </a:ln>
-                        <a:solidFill>
-                          <a:schemeClr val="tx1"/>
-                        </a:solidFill>
-                        <a:effectLst/>
-                        <a:latin typeface="Times New Roman" pitchFamily="18" charset="0"/>
-                        <a:cs typeface="Arial" charset="0"/>
-                      </a:endParaRPr>
                     </a:p>
                   </a:txBody>
                   <a:tcPr horzOverflow="overflow">
@@ -19425,17 +19414,6 @@
                         </a:rPr>
                         <a:t>0?</a:t>
                       </a:r>
-                      <a:endParaRPr kumimoji="0" lang="en-US" sz="1800" b="0" i="0" u="none" strike="noStrike" cap="none" normalizeH="0" baseline="0" dirty="0" smtClean="0">
-                        <a:ln>
-                          <a:noFill/>
-                        </a:ln>
-                        <a:solidFill>
-                          <a:schemeClr val="tx1"/>
-                        </a:solidFill>
-                        <a:effectLst/>
-                        <a:latin typeface="Times New Roman" pitchFamily="18" charset="0"/>
-                        <a:cs typeface="Arial" charset="0"/>
-                      </a:endParaRPr>
                     </a:p>
                   </a:txBody>
                   <a:tcPr horzOverflow="overflow">
@@ -19636,17 +19614,6 @@
                         </a:rPr>
                         <a:t>DPRCM</a:t>
                       </a:r>
-                      <a:endParaRPr kumimoji="0" lang="en-US" sz="1800" b="0" i="0" u="none" strike="noStrike" cap="none" normalizeH="0" baseline="0" dirty="0" smtClean="0">
-                        <a:ln>
-                          <a:noFill/>
-                        </a:ln>
-                        <a:solidFill>
-                          <a:schemeClr val="tx1"/>
-                        </a:solidFill>
-                        <a:effectLst/>
-                        <a:latin typeface="Times New Roman" pitchFamily="18" charset="0"/>
-                        <a:cs typeface="Arial" charset="0"/>
-                      </a:endParaRPr>
                     </a:p>
                   </a:txBody>
                   <a:tcPr horzOverflow="overflow">
@@ -20394,17 +20361,6 @@
                         </a:rPr>
                         <a:t>10</a:t>
                       </a:r>
-                      <a:endParaRPr kumimoji="0" lang="en-US" sz="1800" b="0" i="0" u="none" strike="noStrike" cap="none" normalizeH="0" baseline="0" dirty="0" smtClean="0">
-                        <a:ln>
-                          <a:noFill/>
-                        </a:ln>
-                        <a:solidFill>
-                          <a:schemeClr val="tx1"/>
-                        </a:solidFill>
-                        <a:effectLst/>
-                        <a:latin typeface="Times New Roman" pitchFamily="18" charset="0"/>
-                        <a:cs typeface="Arial" charset="0"/>
-                      </a:endParaRPr>
                     </a:p>
                   </a:txBody>
                   <a:tcPr horzOverflow="overflow">
@@ -20488,17 +20444,6 @@
                         </a:rPr>
                         <a:t>1?</a:t>
                       </a:r>
-                      <a:endParaRPr kumimoji="0" lang="en-US" sz="1800" b="0" i="0" u="none" strike="noStrike" cap="none" normalizeH="0" baseline="0" dirty="0" smtClean="0">
-                        <a:ln>
-                          <a:noFill/>
-                        </a:ln>
-                        <a:solidFill>
-                          <a:schemeClr val="tx1"/>
-                        </a:solidFill>
-                        <a:effectLst/>
-                        <a:latin typeface="Times New Roman" pitchFamily="18" charset="0"/>
-                        <a:cs typeface="Arial" charset="0"/>
-                      </a:endParaRPr>
                     </a:p>
                   </a:txBody>
                   <a:tcPr horzOverflow="overflow">
@@ -21471,17 +21416,6 @@
                         </a:rPr>
                         <a:t>11</a:t>
                       </a:r>
-                      <a:endParaRPr kumimoji="0" lang="en-US" sz="1800" b="0" i="0" u="none" strike="noStrike" cap="none" normalizeH="0" baseline="0" dirty="0" smtClean="0">
-                        <a:ln>
-                          <a:noFill/>
-                        </a:ln>
-                        <a:solidFill>
-                          <a:schemeClr val="tx1"/>
-                        </a:solidFill>
-                        <a:effectLst/>
-                        <a:latin typeface="Times New Roman" pitchFamily="18" charset="0"/>
-                        <a:cs typeface="Arial" charset="0"/>
-                      </a:endParaRPr>
                     </a:p>
                   </a:txBody>
                   <a:tcPr horzOverflow="overflow">
@@ -21565,17 +21499,6 @@
                         </a:rPr>
                         <a:t>0?</a:t>
                       </a:r>
-                      <a:endParaRPr kumimoji="0" lang="en-US" sz="1800" b="0" i="0" u="none" strike="noStrike" cap="none" normalizeH="0" baseline="0" dirty="0" smtClean="0">
-                        <a:ln>
-                          <a:noFill/>
-                        </a:ln>
-                        <a:solidFill>
-                          <a:schemeClr val="tx1"/>
-                        </a:solidFill>
-                        <a:effectLst/>
-                        <a:latin typeface="Times New Roman" pitchFamily="18" charset="0"/>
-                        <a:cs typeface="Arial" charset="0"/>
-                      </a:endParaRPr>
                     </a:p>
                   </a:txBody>
                   <a:tcPr horzOverflow="overflow">
@@ -22502,17 +22425,6 @@
                         </a:rPr>
                         <a:t>00</a:t>
                       </a:r>
-                      <a:endParaRPr kumimoji="0" lang="en-US" sz="1800" b="0" i="0" u="none" strike="noStrike" cap="none" normalizeH="0" baseline="0" dirty="0" smtClean="0">
-                        <a:ln>
-                          <a:noFill/>
-                        </a:ln>
-                        <a:solidFill>
-                          <a:schemeClr val="tx1"/>
-                        </a:solidFill>
-                        <a:effectLst/>
-                        <a:latin typeface="Times New Roman" pitchFamily="18" charset="0"/>
-                        <a:cs typeface="Arial" charset="0"/>
-                      </a:endParaRPr>
                     </a:p>
                   </a:txBody>
                   <a:tcPr horzOverflow="overflow">
@@ -22596,17 +22508,6 @@
                         </a:rPr>
                         <a:t>00</a:t>
                       </a:r>
-                      <a:endParaRPr kumimoji="0" lang="en-US" sz="1800" b="0" i="0" u="none" strike="noStrike" cap="none" normalizeH="0" baseline="0" dirty="0" smtClean="0">
-                        <a:ln>
-                          <a:noFill/>
-                        </a:ln>
-                        <a:solidFill>
-                          <a:schemeClr val="tx1"/>
-                        </a:solidFill>
-                        <a:effectLst/>
-                        <a:latin typeface="Times New Roman" pitchFamily="18" charset="0"/>
-                        <a:cs typeface="Arial" charset="0"/>
-                      </a:endParaRPr>
                     </a:p>
                   </a:txBody>
                   <a:tcPr horzOverflow="overflow">
@@ -23533,17 +23434,6 @@
                         </a:rPr>
                         <a:t>00</a:t>
                       </a:r>
-                      <a:endParaRPr kumimoji="0" lang="en-US" sz="1800" b="0" i="0" u="none" strike="noStrike" cap="none" normalizeH="0" baseline="0" dirty="0" smtClean="0">
-                        <a:ln>
-                          <a:noFill/>
-                        </a:ln>
-                        <a:solidFill>
-                          <a:schemeClr val="tx1"/>
-                        </a:solidFill>
-                        <a:effectLst/>
-                        <a:latin typeface="Times New Roman" pitchFamily="18" charset="0"/>
-                        <a:cs typeface="Arial" charset="0"/>
-                      </a:endParaRPr>
                     </a:p>
                   </a:txBody>
                   <a:tcPr horzOverflow="overflow">
@@ -23627,17 +23517,6 @@
                         </a:rPr>
                         <a:t>00</a:t>
                       </a:r>
-                      <a:endParaRPr kumimoji="0" lang="en-US" sz="1800" b="0" i="0" u="none" strike="noStrike" cap="none" normalizeH="0" baseline="0" dirty="0" smtClean="0">
-                        <a:ln>
-                          <a:noFill/>
-                        </a:ln>
-                        <a:solidFill>
-                          <a:schemeClr val="tx1"/>
-                        </a:solidFill>
-                        <a:effectLst/>
-                        <a:latin typeface="Times New Roman" pitchFamily="18" charset="0"/>
-                        <a:cs typeface="Arial" charset="0"/>
-                      </a:endParaRPr>
                     </a:p>
                   </a:txBody>
                   <a:tcPr horzOverflow="overflow">
@@ -23688,6 +23567,90 @@
                 </a:tc>
               </a:tr>
               <a:tr h="507026">
+                <a:tc>
+                  <a:txBody>
+                    <a:bodyPr/>
+                    <a:lstStyle/>
+                    <a:p>
+                      <a:pPr marL="342900" marR="0" lvl="0" indent="-342900" algn="ctr" defTabSz="914400" rtl="0" eaLnBrk="1" fontAlgn="base" latinLnBrk="0" hangingPunct="1">
+                        <a:lnSpc>
+                          <a:spcPct val="100000"/>
+                        </a:lnSpc>
+                        <a:spcBef>
+                          <a:spcPct val="0"/>
+                        </a:spcBef>
+                        <a:spcAft>
+                          <a:spcPct val="0"/>
+                        </a:spcAft>
+                        <a:buClrTx/>
+                        <a:buSzTx/>
+                        <a:buFontTx/>
+                        <a:buNone/>
+                        <a:tabLst/>
+                        <a:defRPr/>
+                      </a:pPr>
+                      <a:r>
+                        <a:rPr kumimoji="0" lang="en-US" sz="1800" b="0" i="0" u="none" strike="noStrike" cap="none" normalizeH="0" baseline="0" dirty="0" smtClean="0">
+                          <a:ln>
+                            <a:noFill/>
+                          </a:ln>
+                          <a:solidFill>
+                            <a:schemeClr val="tx1"/>
+                          </a:solidFill>
+                          <a:effectLst/>
+                          <a:latin typeface="Times New Roman" pitchFamily="18" charset="0"/>
+                          <a:cs typeface="Arial" charset="0"/>
+                        </a:rPr>
+                        <a:t>11100</a:t>
+                      </a:r>
+                    </a:p>
+                  </a:txBody>
+                  <a:tcPr horzOverflow="overflow">
+                    <a:lnL w="38100" cap="flat" cmpd="sng" algn="ctr">
+                      <a:solidFill>
+                        <a:schemeClr val="tx1"/>
+                      </a:solidFill>
+                      <a:prstDash val="solid"/>
+                      <a:round/>
+                      <a:headEnd type="none" w="med" len="med"/>
+                      <a:tailEnd type="none" w="med" len="med"/>
+                    </a:lnL>
+                    <a:lnR w="12700" cap="flat" cmpd="sng" algn="ctr">
+                      <a:solidFill>
+                        <a:srgbClr val="000000"/>
+                      </a:solidFill>
+                      <a:prstDash val="solid"/>
+                      <a:round/>
+                      <a:headEnd type="none" w="med" len="med"/>
+                      <a:tailEnd type="none" w="med" len="med"/>
+                    </a:lnR>
+                    <a:lnT w="12700" cap="flat" cmpd="sng" algn="ctr">
+                      <a:solidFill>
+                        <a:srgbClr val="000000"/>
+                      </a:solidFill>
+                      <a:prstDash val="solid"/>
+                      <a:round/>
+                      <a:headEnd type="none" w="med" len="med"/>
+                      <a:tailEnd type="none" w="med" len="med"/>
+                    </a:lnT>
+                    <a:lnB w="12700" cap="flat" cmpd="sng" algn="ctr">
+                      <a:solidFill>
+                        <a:srgbClr val="000000"/>
+                      </a:solidFill>
+                      <a:prstDash val="solid"/>
+                      <a:round/>
+                      <a:headEnd type="none" w="med" len="med"/>
+                      <a:tailEnd type="none" w="med" len="med"/>
+                    </a:lnB>
+                    <a:lnTlToBr>
+                      <a:noFill/>
+                    </a:lnTlToBr>
+                    <a:lnBlToTr>
+                      <a:noFill/>
+                    </a:lnBlToTr>
+                    <a:noFill/>
+                  </a:tcPr>
+                </a:tc>
                 <a:tc>
                   <a:txBody>
                     <a:bodyPr/>
@@ -23718,26 +23681,37 @@
                             <a:schemeClr val="tx1"/>
                           </a:solidFill>
                           <a:effectLst/>
-                          <a:latin typeface="Times New Roman" pitchFamily="18" charset="0"/>
-                          <a:cs typeface="Arial" charset="0"/>
+                          <a:latin typeface="Courier New" pitchFamily="49" charset="0"/>
+                          <a:cs typeface="Times New Roman" pitchFamily="18" charset="0"/>
                         </a:rPr>
-                        <a:t>1101</a:t>
-                      </a:r>
+                        <a:t>B</a:t>
+                      </a:r>
+                      <a:endParaRPr kumimoji="0" lang="en-US" sz="1800" b="0" i="0" u="none" strike="noStrike" cap="none" normalizeH="0" baseline="0" dirty="0" smtClean="0">
+                        <a:ln>
+                          <a:noFill/>
+                        </a:ln>
+                        <a:solidFill>
+                          <a:schemeClr val="tx1"/>
+                        </a:solidFill>
+                        <a:effectLst/>
+                        <a:latin typeface="Courier New" pitchFamily="49" charset="0"/>
+                        <a:cs typeface="Arial" charset="0"/>
+                      </a:endParaRPr>
                     </a:p>
                   </a:txBody>
                   <a:tcPr horzOverflow="overflow">
-                    <a:lnL w="38100" cap="flat" cmpd="sng" algn="ctr">
+                    <a:lnL w="12700" cap="flat" cmpd="sng" algn="ctr">
+                      <a:solidFill>
+                        <a:srgbClr val="000000"/>
+                      </a:solidFill>
+                      <a:prstDash val="solid"/>
+                      <a:round/>
+                      <a:headEnd type="none" w="med" len="med"/>
+                      <a:tailEnd type="none" w="med" len="med"/>
+                    </a:lnL>
+                    <a:lnR w="38100" cap="flat" cmpd="sng" algn="ctr">
                       <a:solidFill>
                         <a:schemeClr val="tx1"/>
-                      </a:solidFill>
-                      <a:prstDash val="solid"/>
-                      <a:round/>
-                      <a:headEnd type="none" w="med" len="med"/>
-                      <a:tailEnd type="none" w="med" len="med"/>
-                    </a:lnL>
-                    <a:lnR w="12700" cap="flat" cmpd="sng" algn="ctr">
-                      <a:solidFill>
-                        <a:srgbClr val="000000"/>
                       </a:solidFill>
                       <a:prstDash val="solid"/>
                       <a:round/>
@@ -23801,37 +23775,26 @@
                             <a:schemeClr val="tx1"/>
                           </a:solidFill>
                           <a:effectLst/>
-                          <a:latin typeface="Courier New" pitchFamily="49" charset="0"/>
-                          <a:cs typeface="Times New Roman" pitchFamily="18" charset="0"/>
+                          <a:latin typeface="Times New Roman" pitchFamily="18" charset="0"/>
+                          <a:cs typeface="Arial" charset="0"/>
                         </a:rPr>
-                        <a:t>B</a:t>
-                      </a:r>
-                      <a:endParaRPr kumimoji="0" lang="en-US" sz="1800" b="0" i="0" u="none" strike="noStrike" cap="none" normalizeH="0" baseline="0" dirty="0" smtClean="0">
-                        <a:ln>
-                          <a:noFill/>
-                        </a:ln>
-                        <a:solidFill>
-                          <a:schemeClr val="tx1"/>
-                        </a:solidFill>
-                        <a:effectLst/>
-                        <a:latin typeface="Courier New" pitchFamily="49" charset="0"/>
-                        <a:cs typeface="Arial" charset="0"/>
-                      </a:endParaRPr>
+                        <a:t>1</a:t>
+                      </a:r>
                     </a:p>
                   </a:txBody>
                   <a:tcPr horzOverflow="overflow">
-                    <a:lnL w="12700" cap="flat" cmpd="sng" algn="ctr">
-                      <a:solidFill>
-                        <a:srgbClr val="000000"/>
+                    <a:lnL w="38100" cap="flat" cmpd="sng" algn="ctr">
+                      <a:solidFill>
+                        <a:schemeClr val="tx1"/>
                       </a:solidFill>
                       <a:prstDash val="solid"/>
                       <a:round/>
                       <a:headEnd type="none" w="med" len="med"/>
                       <a:tailEnd type="none" w="med" len="med"/>
                     </a:lnL>
-                    <a:lnR w="38100" cap="flat" cmpd="sng" algn="ctr">
-                      <a:solidFill>
-                        <a:schemeClr val="tx1"/>
+                    <a:lnR w="12700" cap="flat" cmpd="sng" algn="ctr">
+                      <a:solidFill>
+                        <a:srgbClr val="000000"/>
                       </a:solidFill>
                       <a:prstDash val="solid"/>
                       <a:round/>
@@ -23898,14 +23861,14 @@
                           <a:latin typeface="Times New Roman" pitchFamily="18" charset="0"/>
                           <a:cs typeface="Arial" charset="0"/>
                         </a:rPr>
-                        <a:t>1</a:t>
+                        <a:t>0</a:t>
                       </a:r>
                     </a:p>
                   </a:txBody>
                   <a:tcPr horzOverflow="overflow">
-                    <a:lnL w="38100" cap="flat" cmpd="sng" algn="ctr">
-                      <a:solidFill>
-                        <a:schemeClr val="tx1"/>
+                    <a:lnL w="12700" cap="flat" cmpd="sng" algn="ctr">
+                      <a:solidFill>
+                        <a:srgbClr val="000000"/>
                       </a:solidFill>
                       <a:prstDash val="solid"/>
                       <a:round/>
@@ -24064,7 +24027,7 @@
                           <a:latin typeface="Times New Roman" pitchFamily="18" charset="0"/>
                           <a:cs typeface="Arial" charset="0"/>
                         </a:rPr>
-                        <a:t>0</a:t>
+                        <a:t>1</a:t>
                       </a:r>
                     </a:p>
                   </a:txBody>
@@ -24147,7 +24110,7 @@
                           <a:latin typeface="Times New Roman" pitchFamily="18" charset="0"/>
                           <a:cs typeface="Arial" charset="0"/>
                         </a:rPr>
-                        <a:t>1</a:t>
+                        <a:t>11</a:t>
                       </a:r>
                     </a:p>
                   </a:txBody>
@@ -24230,7 +24193,7 @@
                           <a:latin typeface="Times New Roman" pitchFamily="18" charset="0"/>
                           <a:cs typeface="Arial" charset="0"/>
                         </a:rPr>
-                        <a:t>11</a:t>
+                        <a:t>0</a:t>
                       </a:r>
                     </a:p>
                   </a:txBody>
@@ -24313,7 +24276,7 @@
                           <a:latin typeface="Times New Roman" pitchFamily="18" charset="0"/>
                           <a:cs typeface="Arial" charset="0"/>
                         </a:rPr>
-                        <a:t>0</a:t>
+                        <a:t>110XX</a:t>
                       </a:r>
                     </a:p>
                   </a:txBody>
@@ -24396,7 +24359,7 @@
                           <a:latin typeface="Times New Roman" pitchFamily="18" charset="0"/>
                           <a:cs typeface="Arial" charset="0"/>
                         </a:rPr>
-                        <a:t>110XX</a:t>
+                        <a:t>0</a:t>
                       </a:r>
                     </a:p>
                   </a:txBody>
@@ -24479,7 +24442,7 @@
                           <a:latin typeface="Times New Roman" pitchFamily="18" charset="0"/>
                           <a:cs typeface="Arial" charset="0"/>
                         </a:rPr>
-                        <a:t>0</a:t>
+                        <a:t>00</a:t>
                       </a:r>
                     </a:p>
                   </a:txBody>
@@ -24564,17 +24527,6 @@
                         </a:rPr>
                         <a:t>00</a:t>
                       </a:r>
-                      <a:endParaRPr kumimoji="0" lang="en-US" sz="1800" b="0" i="0" u="none" strike="noStrike" cap="none" normalizeH="0" baseline="0" dirty="0" smtClean="0">
-                        <a:ln>
-                          <a:noFill/>
-                        </a:ln>
-                        <a:solidFill>
-                          <a:schemeClr val="tx1"/>
-                        </a:solidFill>
-                        <a:effectLst/>
-                        <a:latin typeface="Times New Roman" pitchFamily="18" charset="0"/>
-                        <a:cs typeface="Arial" charset="0"/>
-                      </a:endParaRPr>
                     </a:p>
                   </a:txBody>
                   <a:tcPr horzOverflow="overflow">
@@ -24587,9 +24539,9 @@
                       <a:headEnd type="none" w="med" len="med"/>
                       <a:tailEnd type="none" w="med" len="med"/>
                     </a:lnL>
-                    <a:lnR w="12700" cap="flat" cmpd="sng" algn="ctr">
-                      <a:solidFill>
-                        <a:srgbClr val="000000"/>
+                    <a:lnR w="38100" cap="flat" cmpd="sng" algn="ctr">
+                      <a:solidFill>
+                        <a:schemeClr val="tx1"/>
                       </a:solidFill>
                       <a:prstDash val="solid"/>
                       <a:round/>
@@ -24623,10 +24575,45 @@
                     <a:noFill/>
                   </a:tcPr>
                 </a:tc>
+              </a:tr>
+              <a:tr h="507026">
                 <a:tc>
                   <a:txBody>
                     <a:bodyPr/>
                     <a:lstStyle/>
+                    <a:p>
+                      <a:pPr marL="342900" marR="0" lvl="0" indent="-342900" algn="ctr" defTabSz="914400" rtl="0" eaLnBrk="1" fontAlgn="base" latinLnBrk="0" hangingPunct="1">
+                        <a:lnSpc>
+                          <a:spcPct val="100000"/>
+                        </a:lnSpc>
+                        <a:spcBef>
+                          <a:spcPct val="0"/>
+                        </a:spcBef>
+                        <a:spcAft>
+                          <a:spcPct val="0"/>
+                        </a:spcAft>
+                        <a:buClrTx/>
+                        <a:buSzTx/>
+                        <a:buFontTx/>
+                        <a:buNone/>
+                        <a:tabLst/>
+                        <a:defRPr/>
+                      </a:pPr>
+                      <a:r>
+                        <a:rPr kumimoji="0" lang="en-US" sz="1800" b="0" i="0" u="none" strike="noStrike" cap="none" normalizeH="0" baseline="0" dirty="0" smtClean="0">
+                          <a:ln>
+                            <a:noFill/>
+                          </a:ln>
+                          <a:solidFill>
+                            <a:schemeClr val="tx1"/>
+                          </a:solidFill>
+                          <a:effectLst/>
+                          <a:latin typeface="Times New Roman" pitchFamily="18" charset="0"/>
+                          <a:cs typeface="Arial" charset="0"/>
+                        </a:rPr>
+                        <a:t>1101</a:t>
+                      </a:r>
+                    </a:p>
                     <a:p>
                       <a:pPr marL="342900" marR="0" lvl="0" indent="-342900" algn="ctr" defTabSz="914400" rtl="0" eaLnBrk="1" fontAlgn="base" latinLnBrk="0" hangingPunct="1">
                         <a:lnSpc>
@@ -24644,20 +24631,6 @@
                         <a:buNone/>
                         <a:tabLst/>
                       </a:pPr>
-                      <a:r>
-                        <a:rPr kumimoji="0" lang="en-US" sz="1800" b="0" i="0" u="none" strike="noStrike" cap="none" normalizeH="0" baseline="0" dirty="0" smtClean="0">
-                          <a:ln>
-                            <a:noFill/>
-                          </a:ln>
-                          <a:solidFill>
-                            <a:schemeClr val="tx1"/>
-                          </a:solidFill>
-                          <a:effectLst/>
-                          <a:latin typeface="Times New Roman" pitchFamily="18" charset="0"/>
-                          <a:cs typeface="Arial" charset="0"/>
-                        </a:rPr>
-                        <a:t>00</a:t>
-                      </a:r>
                       <a:endParaRPr kumimoji="0" lang="en-US" sz="1800" b="0" i="0" u="none" strike="noStrike" cap="none" normalizeH="0" baseline="0" dirty="0" smtClean="0">
                         <a:ln>
                           <a:noFill/>
@@ -24672,18 +24645,18 @@
                     </a:p>
                   </a:txBody>
                   <a:tcPr horzOverflow="overflow">
-                    <a:lnL w="12700" cap="flat" cmpd="sng" algn="ctr">
-                      <a:solidFill>
-                        <a:srgbClr val="000000"/>
+                    <a:lnL w="38100" cap="flat" cmpd="sng" algn="ctr">
+                      <a:solidFill>
+                        <a:schemeClr val="tx1"/>
                       </a:solidFill>
                       <a:prstDash val="solid"/>
                       <a:round/>
                       <a:headEnd type="none" w="med" len="med"/>
                       <a:tailEnd type="none" w="med" len="med"/>
                     </a:lnL>
-                    <a:lnR w="38100" cap="flat" cmpd="sng" algn="ctr">
-                      <a:solidFill>
-                        <a:schemeClr val="tx1"/>
+                    <a:lnR w="12700" cap="flat" cmpd="sng" algn="ctr">
+                      <a:solidFill>
+                        <a:srgbClr val="000000"/>
                       </a:solidFill>
                       <a:prstDash val="solid"/>
                       <a:round/>
@@ -24717,8 +24690,6 @@
                     <a:noFill/>
                   </a:tcPr>
                 </a:tc>
-              </a:tr>
-              <a:tr h="507026">
                 <a:tc>
                   <a:txBody>
                     <a:bodyPr/>
@@ -24749,26 +24720,51 @@
                             <a:schemeClr val="tx1"/>
                           </a:solidFill>
                           <a:effectLst/>
-                          <a:latin typeface="Times New Roman" pitchFamily="18" charset="0"/>
-                          <a:cs typeface="Arial" charset="0"/>
+                          <a:latin typeface="Courier New" pitchFamily="49" charset="0"/>
+                          <a:cs typeface="Times New Roman" pitchFamily="18" charset="0"/>
                         </a:rPr>
-                        <a:t>11100</a:t>
-                      </a:r>
+                        <a:t>B </a:t>
+                      </a:r>
+                      <a:r>
+                        <a:rPr kumimoji="0" lang="en-US" sz="1800" b="0" i="0" u="none" strike="noStrike" cap="none" normalizeH="0" baseline="0" dirty="0" err="1" smtClean="0">
+                          <a:ln>
+                            <a:noFill/>
+                          </a:ln>
+                          <a:solidFill>
+                            <a:schemeClr val="tx1"/>
+                          </a:solidFill>
+                          <a:effectLst/>
+                          <a:latin typeface="Courier New" pitchFamily="49" charset="0"/>
+                          <a:cs typeface="Times New Roman" pitchFamily="18" charset="0"/>
+                        </a:rPr>
+                        <a:t>cond</a:t>
+                      </a:r>
+                      <a:endParaRPr kumimoji="0" lang="en-US" sz="1800" b="0" i="0" u="none" strike="noStrike" cap="none" normalizeH="0" baseline="0" dirty="0" smtClean="0">
+                        <a:ln>
+                          <a:noFill/>
+                        </a:ln>
+                        <a:solidFill>
+                          <a:schemeClr val="tx1"/>
+                        </a:solidFill>
+                        <a:effectLst/>
+                        <a:latin typeface="Courier New" pitchFamily="49" charset="0"/>
+                        <a:cs typeface="Arial" charset="0"/>
+                      </a:endParaRPr>
                     </a:p>
                   </a:txBody>
                   <a:tcPr horzOverflow="overflow">
-                    <a:lnL w="38100" cap="flat" cmpd="sng" algn="ctr">
+                    <a:lnL w="12700" cap="flat" cmpd="sng" algn="ctr">
+                      <a:solidFill>
+                        <a:srgbClr val="000000"/>
+                      </a:solidFill>
+                      <a:prstDash val="solid"/>
+                      <a:round/>
+                      <a:headEnd type="none" w="med" len="med"/>
+                      <a:tailEnd type="none" w="med" len="med"/>
+                    </a:lnL>
+                    <a:lnR w="38100" cap="flat" cmpd="sng" algn="ctr">
                       <a:solidFill>
                         <a:schemeClr val="tx1"/>
-                      </a:solidFill>
-                      <a:prstDash val="solid"/>
-                      <a:round/>
-                      <a:headEnd type="none" w="med" len="med"/>
-                      <a:tailEnd type="none" w="med" len="med"/>
-                    </a:lnL>
-                    <a:lnR w="12700" cap="flat" cmpd="sng" algn="ctr">
-                      <a:solidFill>
-                        <a:srgbClr val="000000"/>
                       </a:solidFill>
                       <a:prstDash val="solid"/>
                       <a:round/>
@@ -24832,51 +24828,26 @@
                             <a:schemeClr val="tx1"/>
                           </a:solidFill>
                           <a:effectLst/>
-                          <a:latin typeface="Courier New" pitchFamily="49" charset="0"/>
-                          <a:cs typeface="Times New Roman" pitchFamily="18" charset="0"/>
+                          <a:latin typeface="Times New Roman" pitchFamily="18" charset="0"/>
+                          <a:cs typeface="Arial" charset="0"/>
                         </a:rPr>
-                        <a:t>B </a:t>
-                      </a:r>
-                      <a:r>
-                        <a:rPr kumimoji="0" lang="en-US" sz="1800" b="0" i="0" u="none" strike="noStrike" cap="none" normalizeH="0" baseline="0" dirty="0" err="1" smtClean="0">
-                          <a:ln>
-                            <a:noFill/>
-                          </a:ln>
-                          <a:solidFill>
-                            <a:schemeClr val="tx1"/>
-                          </a:solidFill>
-                          <a:effectLst/>
-                          <a:latin typeface="Courier New" pitchFamily="49" charset="0"/>
-                          <a:cs typeface="Times New Roman" pitchFamily="18" charset="0"/>
-                        </a:rPr>
-                        <a:t>cond</a:t>
-                      </a:r>
-                      <a:endParaRPr kumimoji="0" lang="en-US" sz="1800" b="0" i="0" u="none" strike="noStrike" cap="none" normalizeH="0" baseline="0" dirty="0" smtClean="0">
-                        <a:ln>
-                          <a:noFill/>
-                        </a:ln>
-                        <a:solidFill>
-                          <a:schemeClr val="tx1"/>
-                        </a:solidFill>
-                        <a:effectLst/>
-                        <a:latin typeface="Courier New" pitchFamily="49" charset="0"/>
-                        <a:cs typeface="Arial" charset="0"/>
-                      </a:endParaRPr>
+                        <a:t>1</a:t>
+                      </a:r>
                     </a:p>
                   </a:txBody>
                   <a:tcPr horzOverflow="overflow">
-                    <a:lnL w="12700" cap="flat" cmpd="sng" algn="ctr">
-                      <a:solidFill>
-                        <a:srgbClr val="000000"/>
+                    <a:lnL w="38100" cap="flat" cmpd="sng" algn="ctr">
+                      <a:solidFill>
+                        <a:schemeClr val="tx1"/>
                       </a:solidFill>
                       <a:prstDash val="solid"/>
                       <a:round/>
                       <a:headEnd type="none" w="med" len="med"/>
                       <a:tailEnd type="none" w="med" len="med"/>
                     </a:lnL>
-                    <a:lnR w="38100" cap="flat" cmpd="sng" algn="ctr">
-                      <a:solidFill>
-                        <a:schemeClr val="tx1"/>
+                    <a:lnR w="12700" cap="flat" cmpd="sng" algn="ctr">
+                      <a:solidFill>
+                        <a:srgbClr val="000000"/>
                       </a:solidFill>
                       <a:prstDash val="solid"/>
                       <a:round/>
@@ -24943,14 +24914,14 @@
                           <a:latin typeface="Times New Roman" pitchFamily="18" charset="0"/>
                           <a:cs typeface="Arial" charset="0"/>
                         </a:rPr>
-                        <a:t>1</a:t>
+                        <a:t>0</a:t>
                       </a:r>
                     </a:p>
                   </a:txBody>
                   <a:tcPr horzOverflow="overflow">
-                    <a:lnL w="38100" cap="flat" cmpd="sng" algn="ctr">
-                      <a:solidFill>
-                        <a:schemeClr val="tx1"/>
+                    <a:lnL w="12700" cap="flat" cmpd="sng" algn="ctr">
+                      <a:solidFill>
+                        <a:srgbClr val="000000"/>
                       </a:solidFill>
                       <a:prstDash val="solid"/>
                       <a:round/>
@@ -25109,7 +25080,7 @@
                           <a:latin typeface="Times New Roman" pitchFamily="18" charset="0"/>
                           <a:cs typeface="Arial" charset="0"/>
                         </a:rPr>
-                        <a:t>0</a:t>
+                        <a:t>1</a:t>
                       </a:r>
                     </a:p>
                   </a:txBody>
@@ -25192,7 +25163,7 @@
                           <a:latin typeface="Times New Roman" pitchFamily="18" charset="0"/>
                           <a:cs typeface="Arial" charset="0"/>
                         </a:rPr>
-                        <a:t>1</a:t>
+                        <a:t>10</a:t>
                       </a:r>
                     </a:p>
                   </a:txBody>
@@ -25275,7 +25246,7 @@
                           <a:latin typeface="Times New Roman" pitchFamily="18" charset="0"/>
                           <a:cs typeface="Arial" charset="0"/>
                         </a:rPr>
-                        <a:t>10</a:t>
+                        <a:t>0</a:t>
                       </a:r>
                     </a:p>
                   </a:txBody>
@@ -25358,7 +25329,7 @@
                           <a:latin typeface="Times New Roman" pitchFamily="18" charset="0"/>
                           <a:cs typeface="Arial" charset="0"/>
                         </a:rPr>
-                        <a:t>0</a:t>
+                        <a:t>110XX</a:t>
                       </a:r>
                     </a:p>
                   </a:txBody>
@@ -25441,7 +25412,7 @@
                           <a:latin typeface="Times New Roman" pitchFamily="18" charset="0"/>
                           <a:cs typeface="Arial" charset="0"/>
                         </a:rPr>
-                        <a:t>110XX</a:t>
+                        <a:t>0</a:t>
                       </a:r>
                     </a:p>
                   </a:txBody>
@@ -25524,7 +25495,7 @@
                           <a:latin typeface="Times New Roman" pitchFamily="18" charset="0"/>
                           <a:cs typeface="Arial" charset="0"/>
                         </a:rPr>
-                        <a:t>0</a:t>
+                        <a:t>00</a:t>
                       </a:r>
                     </a:p>
                   </a:txBody>
@@ -25609,17 +25580,6 @@
                         </a:rPr>
                         <a:t>00</a:t>
                       </a:r>
-                      <a:endParaRPr kumimoji="0" lang="en-US" sz="1800" b="0" i="0" u="none" strike="noStrike" cap="none" normalizeH="0" baseline="0" dirty="0" smtClean="0">
-                        <a:ln>
-                          <a:noFill/>
-                        </a:ln>
-                        <a:solidFill>
-                          <a:schemeClr val="tx1"/>
-                        </a:solidFill>
-                        <a:effectLst/>
-                        <a:latin typeface="Times New Roman" pitchFamily="18" charset="0"/>
-                        <a:cs typeface="Arial" charset="0"/>
-                      </a:endParaRPr>
                     </a:p>
                   </a:txBody>
                   <a:tcPr horzOverflow="overflow">
@@ -25632,9 +25592,9 @@
                       <a:headEnd type="none" w="med" len="med"/>
                       <a:tailEnd type="none" w="med" len="med"/>
                     </a:lnL>
-                    <a:lnR w="12700" cap="flat" cmpd="sng" algn="ctr">
-                      <a:solidFill>
-                        <a:srgbClr val="000000"/>
+                    <a:lnR w="38100" cap="flat" cmpd="sng" algn="ctr">
+                      <a:solidFill>
+                        <a:schemeClr val="tx1"/>
                       </a:solidFill>
                       <a:prstDash val="solid"/>
                       <a:round/>
@@ -25668,6 +25628,8 @@
                     <a:noFill/>
                   </a:tcPr>
                 </a:tc>
+              </a:tr>
+              <a:tr h="507026">
                 <a:tc>
                   <a:txBody>
                     <a:bodyPr/>
@@ -25701,34 +25663,23 @@
                           <a:latin typeface="Times New Roman" pitchFamily="18" charset="0"/>
                           <a:cs typeface="Arial" charset="0"/>
                         </a:rPr>
-                        <a:t>00</a:t>
-                      </a:r>
-                      <a:endParaRPr kumimoji="0" lang="en-US" sz="1800" b="0" i="0" u="none" strike="noStrike" cap="none" normalizeH="0" baseline="0" dirty="0" smtClean="0">
-                        <a:ln>
-                          <a:noFill/>
-                        </a:ln>
-                        <a:solidFill>
-                          <a:schemeClr val="tx1"/>
-                        </a:solidFill>
-                        <a:effectLst/>
-                        <a:latin typeface="Times New Roman" pitchFamily="18" charset="0"/>
-                        <a:cs typeface="Arial" charset="0"/>
-                      </a:endParaRPr>
+                        <a:t>010001110</a:t>
+                      </a:r>
                     </a:p>
                   </a:txBody>
                   <a:tcPr horzOverflow="overflow">
-                    <a:lnL w="12700" cap="flat" cmpd="sng" algn="ctr">
-                      <a:solidFill>
-                        <a:srgbClr val="000000"/>
+                    <a:lnL w="38100" cap="flat" cmpd="sng" algn="ctr">
+                      <a:solidFill>
+                        <a:schemeClr val="tx1"/>
                       </a:solidFill>
                       <a:prstDash val="solid"/>
                       <a:round/>
                       <a:headEnd type="none" w="med" len="med"/>
                       <a:tailEnd type="none" w="med" len="med"/>
                     </a:lnL>
-                    <a:lnR w="38100" cap="flat" cmpd="sng" algn="ctr">
-                      <a:solidFill>
-                        <a:schemeClr val="tx1"/>
+                    <a:lnR w="12700" cap="flat" cmpd="sng" algn="ctr">
+                      <a:solidFill>
+                        <a:srgbClr val="000000"/>
                       </a:solidFill>
                       <a:prstDash val="solid"/>
                       <a:round/>
@@ -25762,8 +25713,6 @@
                     <a:noFill/>
                   </a:tcPr>
                 </a:tc>
-              </a:tr>
-              <a:tr h="507026">
                 <a:tc>
                   <a:txBody>
                     <a:bodyPr/>
@@ -25794,26 +25743,26 @@
                             <a:schemeClr val="tx1"/>
                           </a:solidFill>
                           <a:effectLst/>
-                          <a:latin typeface="Times New Roman" pitchFamily="18" charset="0"/>
+                          <a:latin typeface="Courier New" pitchFamily="49" charset="0"/>
                           <a:cs typeface="Arial" charset="0"/>
                         </a:rPr>
-                        <a:t>010001110</a:t>
+                        <a:t>BX</a:t>
                       </a:r>
                     </a:p>
                   </a:txBody>
                   <a:tcPr horzOverflow="overflow">
-                    <a:lnL w="38100" cap="flat" cmpd="sng" algn="ctr">
+                    <a:lnL w="12700" cap="flat" cmpd="sng" algn="ctr">
+                      <a:solidFill>
+                        <a:srgbClr val="000000"/>
+                      </a:solidFill>
+                      <a:prstDash val="solid"/>
+                      <a:round/>
+                      <a:headEnd type="none" w="med" len="med"/>
+                      <a:tailEnd type="none" w="med" len="med"/>
+                    </a:lnL>
+                    <a:lnR w="38100" cap="flat" cmpd="sng" algn="ctr">
                       <a:solidFill>
                         <a:schemeClr val="tx1"/>
-                      </a:solidFill>
-                      <a:prstDash val="solid"/>
-                      <a:round/>
-                      <a:headEnd type="none" w="med" len="med"/>
-                      <a:tailEnd type="none" w="med" len="med"/>
-                    </a:lnL>
-                    <a:lnR w="12700" cap="flat" cmpd="sng" algn="ctr">
-                      <a:solidFill>
-                        <a:srgbClr val="000000"/>
                       </a:solidFill>
                       <a:prstDash val="solid"/>
                       <a:round/>
@@ -25877,26 +25826,26 @@
                             <a:schemeClr val="tx1"/>
                           </a:solidFill>
                           <a:effectLst/>
-                          <a:latin typeface="Courier New" pitchFamily="49" charset="0"/>
+                          <a:latin typeface="Times New Roman" pitchFamily="18" charset="0"/>
                           <a:cs typeface="Arial" charset="0"/>
                         </a:rPr>
-                        <a:t>BX</a:t>
+                        <a:t>1</a:t>
                       </a:r>
                     </a:p>
                   </a:txBody>
                   <a:tcPr horzOverflow="overflow">
-                    <a:lnL w="12700" cap="flat" cmpd="sng" algn="ctr">
-                      <a:solidFill>
-                        <a:srgbClr val="000000"/>
+                    <a:lnL w="38100" cap="flat" cmpd="sng" algn="ctr">
+                      <a:solidFill>
+                        <a:schemeClr val="tx1"/>
                       </a:solidFill>
                       <a:prstDash val="solid"/>
                       <a:round/>
                       <a:headEnd type="none" w="med" len="med"/>
                       <a:tailEnd type="none" w="med" len="med"/>
                     </a:lnL>
-                    <a:lnR w="38100" cap="flat" cmpd="sng" algn="ctr">
-                      <a:solidFill>
-                        <a:schemeClr val="tx1"/>
+                    <a:lnR w="12700" cap="flat" cmpd="sng" algn="ctr">
+                      <a:solidFill>
+                        <a:srgbClr val="000000"/>
                       </a:solidFill>
                       <a:prstDash val="solid"/>
                       <a:round/>
@@ -25963,14 +25912,14 @@
                           <a:latin typeface="Times New Roman" pitchFamily="18" charset="0"/>
                           <a:cs typeface="Arial" charset="0"/>
                         </a:rPr>
-                        <a:t>1</a:t>
+                        <a:t>0</a:t>
                       </a:r>
                     </a:p>
                   </a:txBody>
                   <a:tcPr horzOverflow="overflow">
-                    <a:lnL w="38100" cap="flat" cmpd="sng" algn="ctr">
-                      <a:solidFill>
-                        <a:schemeClr val="tx1"/>
+                    <a:lnL w="12700" cap="flat" cmpd="sng" algn="ctr">
+                      <a:solidFill>
+                        <a:srgbClr val="000000"/>
                       </a:solidFill>
                       <a:prstDash val="solid"/>
                       <a:round/>
@@ -26212,7 +26161,7 @@
                           <a:latin typeface="Times New Roman" pitchFamily="18" charset="0"/>
                           <a:cs typeface="Arial" charset="0"/>
                         </a:rPr>
-                        <a:t>0</a:t>
+                        <a:t>XX</a:t>
                       </a:r>
                     </a:p>
                   </a:txBody>
@@ -26295,7 +26244,7 @@
                           <a:latin typeface="Times New Roman" pitchFamily="18" charset="0"/>
                           <a:cs typeface="Arial" charset="0"/>
                         </a:rPr>
-                        <a:t>XX</a:t>
+                        <a:t>0</a:t>
                       </a:r>
                     </a:p>
                   </a:txBody>
@@ -26378,7 +26327,7 @@
                           <a:latin typeface="Times New Roman" pitchFamily="18" charset="0"/>
                           <a:cs typeface="Arial" charset="0"/>
                         </a:rPr>
-                        <a:t>0</a:t>
+                        <a:t>1110X</a:t>
                       </a:r>
                     </a:p>
                   </a:txBody>
@@ -26461,7 +26410,7 @@
                           <a:latin typeface="Times New Roman" pitchFamily="18" charset="0"/>
                           <a:cs typeface="Arial" charset="0"/>
                         </a:rPr>
-                        <a:t>1110X</a:t>
+                        <a:t>0</a:t>
                       </a:r>
                     </a:p>
                   </a:txBody>
@@ -26544,7 +26493,7 @@
                           <a:latin typeface="Times New Roman" pitchFamily="18" charset="0"/>
                           <a:cs typeface="Arial" charset="0"/>
                         </a:rPr>
-                        <a:t>0</a:t>
+                        <a:t>00</a:t>
                       </a:r>
                     </a:p>
                   </a:txBody>
@@ -26629,17 +26578,6 @@
                         </a:rPr>
                         <a:t>00</a:t>
                       </a:r>
-                      <a:endParaRPr kumimoji="0" lang="en-US" sz="1800" b="0" i="0" u="none" strike="noStrike" cap="none" normalizeH="0" baseline="0" dirty="0" smtClean="0">
-                        <a:ln>
-                          <a:noFill/>
-                        </a:ln>
-                        <a:solidFill>
-                          <a:schemeClr val="tx1"/>
-                        </a:solidFill>
-                        <a:effectLst/>
-                        <a:latin typeface="Times New Roman" pitchFamily="18" charset="0"/>
-                        <a:cs typeface="Arial" charset="0"/>
-                      </a:endParaRPr>
                     </a:p>
                   </a:txBody>
                   <a:tcPr horzOverflow="overflow">
@@ -26652,9 +26590,9 @@
                       <a:headEnd type="none" w="med" len="med"/>
                       <a:tailEnd type="none" w="med" len="med"/>
                     </a:lnL>
-                    <a:lnR w="12700" cap="flat" cmpd="sng" algn="ctr">
-                      <a:solidFill>
-                        <a:srgbClr val="000000"/>
+                    <a:lnR w="38100" cap="flat" cmpd="sng" algn="ctr">
+                      <a:solidFill>
+                        <a:schemeClr val="tx1"/>
                       </a:solidFill>
                       <a:prstDash val="solid"/>
                       <a:round/>
@@ -26688,6 +26626,8 @@
                     <a:noFill/>
                   </a:tcPr>
                 </a:tc>
+              </a:tr>
+              <a:tr h="507026">
                 <a:tc>
                   <a:txBody>
                     <a:bodyPr/>
@@ -26721,34 +26661,23 @@
                           <a:latin typeface="Times New Roman" pitchFamily="18" charset="0"/>
                           <a:cs typeface="Arial" charset="0"/>
                         </a:rPr>
-                        <a:t>00</a:t>
-                      </a:r>
-                      <a:endParaRPr kumimoji="0" lang="en-US" sz="1800" b="0" i="0" u="none" strike="noStrike" cap="none" normalizeH="0" baseline="0" dirty="0" smtClean="0">
-                        <a:ln>
-                          <a:noFill/>
-                        </a:ln>
-                        <a:solidFill>
-                          <a:schemeClr val="tx1"/>
-                        </a:solidFill>
-                        <a:effectLst/>
-                        <a:latin typeface="Times New Roman" pitchFamily="18" charset="0"/>
-                        <a:cs typeface="Arial" charset="0"/>
-                      </a:endParaRPr>
+                        <a:t>010001111</a:t>
+                      </a:r>
                     </a:p>
                   </a:txBody>
                   <a:tcPr horzOverflow="overflow">
-                    <a:lnL w="12700" cap="flat" cmpd="sng" algn="ctr">
-                      <a:solidFill>
-                        <a:srgbClr val="000000"/>
+                    <a:lnL w="38100" cap="flat" cmpd="sng" algn="ctr">
+                      <a:solidFill>
+                        <a:schemeClr val="tx1"/>
                       </a:solidFill>
                       <a:prstDash val="solid"/>
                       <a:round/>
                       <a:headEnd type="none" w="med" len="med"/>
                       <a:tailEnd type="none" w="med" len="med"/>
                     </a:lnL>
-                    <a:lnR w="38100" cap="flat" cmpd="sng" algn="ctr">
-                      <a:solidFill>
-                        <a:schemeClr val="tx1"/>
+                    <a:lnR w="12700" cap="flat" cmpd="sng" algn="ctr">
+                      <a:solidFill>
+                        <a:srgbClr val="000000"/>
                       </a:solidFill>
                       <a:prstDash val="solid"/>
                       <a:round/>
@@ -26764,9 +26693,9 @@
                       <a:headEnd type="none" w="med" len="med"/>
                       <a:tailEnd type="none" w="med" len="med"/>
                     </a:lnT>
-                    <a:lnB w="12700" cap="flat" cmpd="sng" algn="ctr">
-                      <a:solidFill>
-                        <a:srgbClr val="000000"/>
+                    <a:lnB w="38100" cap="flat" cmpd="sng" algn="ctr">
+                      <a:solidFill>
+                        <a:schemeClr val="tx1"/>
                       </a:solidFill>
                       <a:prstDash val="solid"/>
                       <a:round/>
@@ -26782,8 +26711,6 @@
                     <a:noFill/>
                   </a:tcPr>
                 </a:tc>
-              </a:tr>
-              <a:tr h="507026">
                 <a:tc>
                   <a:txBody>
                     <a:bodyPr/>
@@ -26814,26 +26741,26 @@
                             <a:schemeClr val="tx1"/>
                           </a:solidFill>
                           <a:effectLst/>
-                          <a:latin typeface="Times New Roman" pitchFamily="18" charset="0"/>
+                          <a:latin typeface="Courier New" pitchFamily="49" charset="0"/>
                           <a:cs typeface="Arial" charset="0"/>
                         </a:rPr>
-                        <a:t>010001111</a:t>
+                        <a:t>BLX</a:t>
                       </a:r>
                     </a:p>
                   </a:txBody>
                   <a:tcPr horzOverflow="overflow">
-                    <a:lnL w="38100" cap="flat" cmpd="sng" algn="ctr">
+                    <a:lnL w="12700" cap="flat" cmpd="sng" algn="ctr">
+                      <a:solidFill>
+                        <a:srgbClr val="000000"/>
+                      </a:solidFill>
+                      <a:prstDash val="solid"/>
+                      <a:round/>
+                      <a:headEnd type="none" w="med" len="med"/>
+                      <a:tailEnd type="none" w="med" len="med"/>
+                    </a:lnL>
+                    <a:lnR w="38100" cap="flat" cmpd="sng" algn="ctr">
                       <a:solidFill>
                         <a:schemeClr val="tx1"/>
-                      </a:solidFill>
-                      <a:prstDash val="solid"/>
-                      <a:round/>
-                      <a:headEnd type="none" w="med" len="med"/>
-                      <a:tailEnd type="none" w="med" len="med"/>
-                    </a:lnL>
-                    <a:lnR w="12700" cap="flat" cmpd="sng" algn="ctr">
-                      <a:solidFill>
-                        <a:srgbClr val="000000"/>
                       </a:solidFill>
                       <a:prstDash val="solid"/>
                       <a:round/>
@@ -26897,26 +26824,26 @@
                             <a:schemeClr val="tx1"/>
                           </a:solidFill>
                           <a:effectLst/>
-                          <a:latin typeface="Courier New" pitchFamily="49" charset="0"/>
+                          <a:latin typeface="Times New Roman" pitchFamily="18" charset="0"/>
                           <a:cs typeface="Arial" charset="0"/>
                         </a:rPr>
-                        <a:t>BLX</a:t>
+                        <a:t>1</a:t>
                       </a:r>
                     </a:p>
                   </a:txBody>
                   <a:tcPr horzOverflow="overflow">
-                    <a:lnL w="12700" cap="flat" cmpd="sng" algn="ctr">
-                      <a:solidFill>
-                        <a:srgbClr val="000000"/>
+                    <a:lnL w="38100" cap="flat" cmpd="sng" algn="ctr">
+                      <a:solidFill>
+                        <a:schemeClr val="tx1"/>
                       </a:solidFill>
                       <a:prstDash val="solid"/>
                       <a:round/>
                       <a:headEnd type="none" w="med" len="med"/>
                       <a:tailEnd type="none" w="med" len="med"/>
                     </a:lnL>
-                    <a:lnR w="38100" cap="flat" cmpd="sng" algn="ctr">
-                      <a:solidFill>
-                        <a:schemeClr val="tx1"/>
+                    <a:lnR w="12700" cap="flat" cmpd="sng" algn="ctr">
+                      <a:solidFill>
+                        <a:srgbClr val="000000"/>
                       </a:solidFill>
                       <a:prstDash val="solid"/>
                       <a:round/>
@@ -26983,14 +26910,14 @@
                           <a:latin typeface="Times New Roman" pitchFamily="18" charset="0"/>
                           <a:cs typeface="Arial" charset="0"/>
                         </a:rPr>
-                        <a:t>1</a:t>
+                        <a:t>0</a:t>
                       </a:r>
                     </a:p>
                   </a:txBody>
                   <a:tcPr horzOverflow="overflow">
-                    <a:lnL w="38100" cap="flat" cmpd="sng" algn="ctr">
-                      <a:solidFill>
-                        <a:schemeClr val="tx1"/>
+                    <a:lnL w="12700" cap="flat" cmpd="sng" algn="ctr">
+                      <a:solidFill>
+                        <a:srgbClr val="000000"/>
                       </a:solidFill>
                       <a:prstDash val="solid"/>
                       <a:round/>
@@ -27232,7 +27159,7 @@
                           <a:latin typeface="Times New Roman" pitchFamily="18" charset="0"/>
                           <a:cs typeface="Arial" charset="0"/>
                         </a:rPr>
-                        <a:t>0</a:t>
+                        <a:t>XX</a:t>
                       </a:r>
                     </a:p>
                   </a:txBody>
@@ -27315,7 +27242,7 @@
                           <a:latin typeface="Times New Roman" pitchFamily="18" charset="0"/>
                           <a:cs typeface="Arial" charset="0"/>
                         </a:rPr>
-                        <a:t>XX</a:t>
+                        <a:t>0</a:t>
                       </a:r>
                     </a:p>
                   </a:txBody>
@@ -27398,7 +27325,7 @@
                           <a:latin typeface="Times New Roman" pitchFamily="18" charset="0"/>
                           <a:cs typeface="Arial" charset="0"/>
                         </a:rPr>
-                        <a:t>0</a:t>
+                        <a:t>1110X</a:t>
                       </a:r>
                     </a:p>
                   </a:txBody>
@@ -27481,7 +27408,7 @@
                           <a:latin typeface="Times New Roman" pitchFamily="18" charset="0"/>
                           <a:cs typeface="Arial" charset="0"/>
                         </a:rPr>
-                        <a:t>1110X</a:t>
+                        <a:t>1</a:t>
                       </a:r>
                     </a:p>
                   </a:txBody>
@@ -27564,7 +27491,7 @@
                           <a:latin typeface="Times New Roman" pitchFamily="18" charset="0"/>
                           <a:cs typeface="Arial" charset="0"/>
                         </a:rPr>
-                        <a:t>1</a:t>
+                        <a:t>00</a:t>
                       </a:r>
                     </a:p>
                   </a:txBody>
@@ -27649,111 +27576,6 @@
                         </a:rPr>
                         <a:t>00</a:t>
                       </a:r>
-                      <a:endParaRPr kumimoji="0" lang="en-US" sz="1800" b="0" i="0" u="none" strike="noStrike" cap="none" normalizeH="0" baseline="0" dirty="0" smtClean="0">
-                        <a:ln>
-                          <a:noFill/>
-                        </a:ln>
-                        <a:solidFill>
-                          <a:schemeClr val="tx1"/>
-                        </a:solidFill>
-                        <a:effectLst/>
-                        <a:latin typeface="Times New Roman" pitchFamily="18" charset="0"/>
-                        <a:cs typeface="Arial" charset="0"/>
-                      </a:endParaRPr>
-                    </a:p>
-                  </a:txBody>
-                  <a:tcPr horzOverflow="overflow">
-                    <a:lnL w="12700" cap="flat" cmpd="sng" algn="ctr">
-                      <a:solidFill>
-                        <a:srgbClr val="000000"/>
-                      </a:solidFill>
-                      <a:prstDash val="solid"/>
-                      <a:round/>
-                      <a:headEnd type="none" w="med" len="med"/>
-                      <a:tailEnd type="none" w="med" len="med"/>
-                    </a:lnL>
-                    <a:lnR w="12700" cap="flat" cmpd="sng" algn="ctr">
-                      <a:solidFill>
-                        <a:srgbClr val="000000"/>
-                      </a:solidFill>
-                      <a:prstDash val="solid"/>
-                      <a:round/>
-                      <a:headEnd type="none" w="med" len="med"/>
-                      <a:tailEnd type="none" w="med" len="med"/>
-                    </a:lnR>
-                    <a:lnT w="12700" cap="flat" cmpd="sng" algn="ctr">
-                      <a:solidFill>
-                        <a:srgbClr val="000000"/>
-                      </a:solidFill>
-                      <a:prstDash val="solid"/>
-                      <a:round/>
-                      <a:headEnd type="none" w="med" len="med"/>
-                      <a:tailEnd type="none" w="med" len="med"/>
-                    </a:lnT>
-                    <a:lnB w="38100" cap="flat" cmpd="sng" algn="ctr">
-                      <a:solidFill>
-                        <a:schemeClr val="tx1"/>
-                      </a:solidFill>
-                      <a:prstDash val="solid"/>
-                      <a:round/>
-                      <a:headEnd type="none" w="med" len="med"/>
-                      <a:tailEnd type="none" w="med" len="med"/>
-                    </a:lnB>
-                    <a:lnTlToBr>
-                      <a:noFill/>
-                    </a:lnTlToBr>
-                    <a:lnBlToTr>
-                      <a:noFill/>
-                    </a:lnBlToTr>
-                    <a:noFill/>
-                  </a:tcPr>
-                </a:tc>
-                <a:tc>
-                  <a:txBody>
-                    <a:bodyPr/>
-                    <a:lstStyle/>
-                    <a:p>
-                      <a:pPr marL="342900" marR="0" lvl="0" indent="-342900" algn="ctr" defTabSz="914400" rtl="0" eaLnBrk="1" fontAlgn="base" latinLnBrk="0" hangingPunct="1">
-                        <a:lnSpc>
-                          <a:spcPct val="100000"/>
-                        </a:lnSpc>
-                        <a:spcBef>
-                          <a:spcPct val="0"/>
-                        </a:spcBef>
-                        <a:spcAft>
-                          <a:spcPct val="0"/>
-                        </a:spcAft>
-                        <a:buClrTx/>
-                        <a:buSzTx/>
-                        <a:buFontTx/>
-                        <a:buNone/>
-                        <a:tabLst/>
-                      </a:pPr>
-                      <a:r>
-                        <a:rPr kumimoji="0" lang="en-US" sz="1800" b="0" i="0" u="none" strike="noStrike" cap="none" normalizeH="0" baseline="0" dirty="0" smtClean="0">
-                          <a:ln>
-                            <a:noFill/>
-                          </a:ln>
-                          <a:solidFill>
-                            <a:schemeClr val="tx1"/>
-                          </a:solidFill>
-                          <a:effectLst/>
-                          <a:latin typeface="Times New Roman" pitchFamily="18" charset="0"/>
-                          <a:cs typeface="Arial" charset="0"/>
-                        </a:rPr>
-                        <a:t>00</a:t>
-                      </a:r>
-                      <a:endParaRPr kumimoji="0" lang="en-US" sz="1800" b="0" i="0" u="none" strike="noStrike" cap="none" normalizeH="0" baseline="0" dirty="0" smtClean="0">
-                        <a:ln>
-                          <a:noFill/>
-                        </a:ln>
-                        <a:solidFill>
-                          <a:schemeClr val="tx1"/>
-                        </a:solidFill>
-                        <a:effectLst/>
-                        <a:latin typeface="Times New Roman" pitchFamily="18" charset="0"/>
-                        <a:cs typeface="Arial" charset="0"/>
-                      </a:endParaRPr>
                     </a:p>
                   </a:txBody>
                   <a:tcPr horzOverflow="overflow">

</xml_diff>